<commit_message>
new docs and fixes
</commit_message>
<xml_diff>
--- a/info/PyGameTower.pptx
+++ b/info/PyGameTower.pptx
@@ -7,8 +7,9 @@
   <p:sldIdLst>
     <p:sldId id="256" r:id="rId2"/>
     <p:sldId id="257" r:id="rId3"/>
-    <p:sldId id="259" r:id="rId4"/>
-    <p:sldId id="258" r:id="rId5"/>
+    <p:sldId id="258" r:id="rId4"/>
+    <p:sldId id="259" r:id="rId5"/>
+    <p:sldId id="260" r:id="rId6"/>
   </p:sldIdLst>
   <p:sldSz cx="12192000" cy="6858000"/>
   <p:notesSz cx="6858000" cy="9144000"/>
@@ -345,7 +346,7 @@
             <a:fld id="{08B9EBBA-996F-894A-B54A-D6246ED52CEA}" type="datetimeFigureOut">
               <a:rPr lang="en-US" smtClean="0"/>
               <a:pPr/>
-              <a:t>1/13/2022</a:t>
+              <a:t>1/16/2022</a:t>
             </a:fld>
             <a:endParaRPr lang="en-US" dirty="0"/>
           </a:p>
@@ -681,7 +682,7 @@
             <a:fld id="{09B482E8-6E0E-1B4F-B1FD-C69DB9E858D9}" type="datetimeFigureOut">
               <a:rPr lang="en-US" smtClean="0"/>
               <a:pPr/>
-              <a:t>1/13/2022</a:t>
+              <a:t>1/16/2022</a:t>
             </a:fld>
             <a:endParaRPr lang="en-US" dirty="0"/>
           </a:p>
@@ -962,7 +963,7 @@
             <a:fld id="{09B482E8-6E0E-1B4F-B1FD-C69DB9E858D9}" type="datetimeFigureOut">
               <a:rPr lang="en-US" smtClean="0"/>
               <a:pPr/>
-              <a:t>1/13/2022</a:t>
+              <a:t>1/16/2022</a:t>
             </a:fld>
             <a:endParaRPr lang="en-US" dirty="0"/>
           </a:p>
@@ -1533,7 +1534,7 @@
             <a:fld id="{09B482E8-6E0E-1B4F-B1FD-C69DB9E858D9}" type="datetimeFigureOut">
               <a:rPr lang="en-US" smtClean="0"/>
               <a:pPr/>
-              <a:t>1/13/2022</a:t>
+              <a:t>1/16/2022</a:t>
             </a:fld>
             <a:endParaRPr lang="en-US" dirty="0"/>
           </a:p>
@@ -1814,7 +1815,7 @@
             <a:fld id="{09B482E8-6E0E-1B4F-B1FD-C69DB9E858D9}" type="datetimeFigureOut">
               <a:rPr lang="en-US" smtClean="0"/>
               <a:pPr/>
-              <a:t>1/13/2022</a:t>
+              <a:t>1/16/2022</a:t>
             </a:fld>
             <a:endParaRPr lang="en-US" dirty="0"/>
           </a:p>
@@ -2379,7 +2380,7 @@
             <a:fld id="{09B482E8-6E0E-1B4F-B1FD-C69DB9E858D9}" type="datetimeFigureOut">
               <a:rPr lang="en-US" smtClean="0"/>
               <a:pPr/>
-              <a:t>1/13/2022</a:t>
+              <a:t>1/16/2022</a:t>
             </a:fld>
             <a:endParaRPr lang="en-US" dirty="0"/>
           </a:p>
@@ -2709,7 +2710,7 @@
             <a:fld id="{09B482E8-6E0E-1B4F-B1FD-C69DB9E858D9}" type="datetimeFigureOut">
               <a:rPr lang="en-US" smtClean="0"/>
               <a:pPr/>
-              <a:t>1/13/2022</a:t>
+              <a:t>1/16/2022</a:t>
             </a:fld>
             <a:endParaRPr lang="en-US" dirty="0"/>
           </a:p>
@@ -2889,7 +2890,7 @@
             <a:fld id="{C6C52C72-DE31-F449-A4ED-4C594FD91407}" type="datetimeFigureOut">
               <a:rPr lang="en-US" smtClean="0"/>
               <a:pPr/>
-              <a:t>1/13/2022</a:t>
+              <a:t>1/16/2022</a:t>
             </a:fld>
             <a:endParaRPr lang="en-US" dirty="0"/>
           </a:p>
@@ -3129,7 +3130,7 @@
             <a:fld id="{ED62726E-379B-B349-9EED-81ED093FA806}" type="datetimeFigureOut">
               <a:rPr lang="en-US" smtClean="0"/>
               <a:pPr/>
-              <a:t>1/13/2022</a:t>
+              <a:t>1/16/2022</a:t>
             </a:fld>
             <a:endParaRPr lang="en-US" dirty="0"/>
           </a:p>
@@ -3331,7 +3332,7 @@
             <a:fld id="{9B3A1323-8D79-1946-B0D7-40001CF92E9D}" type="datetimeFigureOut">
               <a:rPr lang="en-US" smtClean="0"/>
               <a:pPr/>
-              <a:t>1/13/2022</a:t>
+              <a:t>1/16/2022</a:t>
             </a:fld>
             <a:endParaRPr lang="en-US" dirty="0"/>
           </a:p>
@@ -3609,7 +3610,7 @@
             <a:fld id="{8DFA1846-DA80-1C48-A609-854EA85C59AD}" type="datetimeFigureOut">
               <a:rPr lang="en-US" smtClean="0"/>
               <a:pPr/>
-              <a:t>1/13/2022</a:t>
+              <a:t>1/16/2022</a:t>
             </a:fld>
             <a:endParaRPr lang="en-US" dirty="0"/>
           </a:p>
@@ -3877,7 +3878,7 @@
             <a:fld id="{57302355-E14B-8545-A8F8-0FE83CC9D524}" type="datetimeFigureOut">
               <a:rPr lang="en-US" smtClean="0"/>
               <a:pPr/>
-              <a:t>1/13/2022</a:t>
+              <a:t>1/16/2022</a:t>
             </a:fld>
             <a:endParaRPr lang="en-US" dirty="0"/>
           </a:p>
@@ -4253,7 +4254,7 @@
             <a:fld id="{02640F58-564D-2B4F-AE67-E407BA4FCF45}" type="datetimeFigureOut">
               <a:rPr lang="en-US" smtClean="0"/>
               <a:pPr/>
-              <a:t>1/13/2022</a:t>
+              <a:t>1/16/2022</a:t>
             </a:fld>
             <a:endParaRPr lang="en-US" dirty="0"/>
           </a:p>
@@ -4403,7 +4404,7 @@
             <a:fld id="{F13A34C8-038E-2045-AF43-DF7DBB8E0E9E}" type="datetimeFigureOut">
               <a:rPr lang="en-US" smtClean="0"/>
               <a:pPr/>
-              <a:t>1/13/2022</a:t>
+              <a:t>1/16/2022</a:t>
             </a:fld>
             <a:endParaRPr lang="en-US" dirty="0"/>
           </a:p>
@@ -4530,7 +4531,7 @@
             <a:fld id="{8818C68F-D26B-8F47-958C-23B49CF8A634}" type="datetimeFigureOut">
               <a:rPr lang="en-US" smtClean="0"/>
               <a:pPr/>
-              <a:t>1/13/2022</a:t>
+              <a:t>1/16/2022</a:t>
             </a:fld>
             <a:endParaRPr lang="en-US" dirty="0"/>
           </a:p>
@@ -4817,7 +4818,7 @@
             <a:fld id="{D0DF5E60-9974-AC48-9591-99C2BB44B7CF}" type="datetimeFigureOut">
               <a:rPr lang="en-US" smtClean="0"/>
               <a:pPr/>
-              <a:t>1/13/2022</a:t>
+              <a:t>1/16/2022</a:t>
             </a:fld>
             <a:endParaRPr lang="en-US" dirty="0"/>
           </a:p>
@@ -5143,7 +5144,7 @@
             <a:fld id="{09B482E8-6E0E-1B4F-B1FD-C69DB9E858D9}" type="datetimeFigureOut">
               <a:rPr lang="en-US" smtClean="0"/>
               <a:pPr/>
-              <a:t>1/13/2022</a:t>
+              <a:t>1/16/2022</a:t>
             </a:fld>
             <a:endParaRPr lang="en-US" dirty="0"/>
           </a:p>
@@ -5360,7 +5361,7 @@
             <a:fld id="{09B482E8-6E0E-1B4F-B1FD-C69DB9E858D9}" type="datetimeFigureOut">
               <a:rPr lang="en-US" smtClean="0"/>
               <a:pPr/>
-              <a:t>1/13/2022</a:t>
+              <a:t>1/16/2022</a:t>
             </a:fld>
             <a:endParaRPr lang="en-US" dirty="0"/>
           </a:p>
@@ -6017,14 +6018,6 @@
               </a:rPr>
               <a:t>Лебедев Фёдор</a:t>
             </a:r>
-            <a:endParaRPr lang="ru-RU" sz="2500" dirty="0" smtClean="0">
-              <a:solidFill>
-                <a:schemeClr val="accent4">
-                  <a:lumMod val="60000"/>
-                  <a:lumOff val="40000"/>
-                </a:schemeClr>
-              </a:solidFill>
-            </a:endParaRPr>
           </a:p>
         </p:txBody>
       </p:sp>
@@ -6146,7 +6139,7 @@
       </p:sp>
       <p:pic>
         <p:nvPicPr>
-          <p:cNvPr id="5" name="Рисунок 4"/>
+          <p:cNvPr id="3" name="Рисунок 2"/>
           <p:cNvPicPr>
             <a:picLocks noChangeAspect="1"/>
           </p:cNvPicPr>
@@ -6166,8 +6159,8 @@
         </p:blipFill>
         <p:spPr>
           <a:xfrm>
-            <a:off x="685801" y="3733800"/>
-            <a:ext cx="10058400" cy="2225309"/>
+            <a:off x="0" y="3187120"/>
+            <a:ext cx="12192000" cy="2595193"/>
           </a:xfrm>
           <a:prstGeom prst="rect">
             <a:avLst/>
@@ -6206,7 +6199,13 @@
       </p:grpSpPr>
       <p:sp>
         <p:nvSpPr>
-          <p:cNvPr id="2" name="Заголовок 1"/>
+          <p:cNvPr id="2" name="Заголовок 1">
+            <a:extLst>
+              <a:ext uri="{FF2B5EF4-FFF2-40B4-BE49-F238E27FC236}">
+                <a16:creationId xmlns:a16="http://schemas.microsoft.com/office/drawing/2014/main" id="{BA8E6D09-537C-44D2-B3C4-C52692C2C1E2}"/>
+              </a:ext>
+            </a:extLst>
+          </p:cNvPr>
           <p:cNvSpPr>
             <a:spLocks noGrp="1"/>
           </p:cNvSpPr>
@@ -6214,15 +6213,18 @@
             <p:ph type="title"/>
           </p:nvPr>
         </p:nvSpPr>
-        <p:spPr/>
-        <p:txBody>
-          <a:bodyPr>
-            <a:normAutofit/>
-          </a:bodyPr>
-          <a:lstStyle/>
-          <a:p>
-            <a:r>
-              <a:rPr lang="ru-RU" sz="3200" cap="none" dirty="0" smtClean="0">
+        <p:spPr>
+          <a:xfrm>
+            <a:off x="684212" y="73550"/>
+            <a:ext cx="10058400" cy="2152815"/>
+          </a:xfrm>
+        </p:spPr>
+        <p:txBody>
+          <a:bodyPr/>
+          <a:lstStyle/>
+          <a:p>
+            <a:r>
+              <a:rPr lang="ru-RU" dirty="0" smtClean="0">
                 <a:solidFill>
                   <a:schemeClr val="accent2">
                     <a:lumMod val="60000"/>
@@ -6230,9 +6232,9 @@
                   </a:schemeClr>
                 </a:solidFill>
               </a:rPr>
-              <a:t>Выбор уровней</a:t>
-            </a:r>
-            <a:endParaRPr lang="ru-RU" sz="3200" cap="none" dirty="0">
+              <a:t>Управление и игровой процесс</a:t>
+            </a:r>
+            <a:endParaRPr lang="ru-RU" dirty="0">
               <a:solidFill>
                 <a:schemeClr val="accent2">
                   <a:lumMod val="60000"/>
@@ -6240,6 +6242,258 @@
                 </a:schemeClr>
               </a:solidFill>
             </a:endParaRPr>
+          </a:p>
+        </p:txBody>
+      </p:sp>
+      <p:pic>
+        <p:nvPicPr>
+          <p:cNvPr id="5" name="Рисунок 4"/>
+          <p:cNvPicPr>
+            <a:picLocks noChangeAspect="1"/>
+          </p:cNvPicPr>
+          <p:nvPr/>
+        </p:nvPicPr>
+        <p:blipFill>
+          <a:blip r:embed="rId2">
+            <a:extLst>
+              <a:ext uri="{28A0092B-C50C-407E-A947-70E740481C1C}">
+                <a14:useLocalDpi xmlns:a14="http://schemas.microsoft.com/office/drawing/2010/main" val="0"/>
+              </a:ext>
+            </a:extLst>
+          </a:blip>
+          <a:stretch>
+            <a:fillRect/>
+          </a:stretch>
+        </p:blipFill>
+        <p:spPr>
+          <a:xfrm>
+            <a:off x="684212" y="2226365"/>
+            <a:ext cx="762000" cy="762000"/>
+          </a:xfrm>
+          <a:prstGeom prst="rect">
+            <a:avLst/>
+          </a:prstGeom>
+        </p:spPr>
+      </p:pic>
+      <p:sp>
+        <p:nvSpPr>
+          <p:cNvPr id="6" name="TextBox 5"/>
+          <p:cNvSpPr txBox="1"/>
+          <p:nvPr/>
+        </p:nvSpPr>
+        <p:spPr>
+          <a:xfrm>
+            <a:off x="1446212" y="2238033"/>
+            <a:ext cx="9892348" cy="369332"/>
+          </a:xfrm>
+          <a:prstGeom prst="rect">
+            <a:avLst/>
+          </a:prstGeom>
+          <a:noFill/>
+        </p:spPr>
+        <p:txBody>
+          <a:bodyPr wrap="square" rtlCol="0">
+            <a:spAutoFit/>
+          </a:bodyPr>
+          <a:lstStyle/>
+          <a:p>
+            <a:r>
+              <a:rPr lang="ru-RU" dirty="0" smtClean="0"/>
+              <a:t>Чтобы </a:t>
+            </a:r>
+            <a:r>
+              <a:rPr lang="ru-RU" dirty="0" smtClean="0"/>
+              <a:t>призвать новые отряды необходимо </a:t>
+            </a:r>
+            <a:r>
+              <a:rPr lang="ru-RU" dirty="0" smtClean="0"/>
+              <a:t>нажать на башню игрока и на появившуюся кнопку </a:t>
+            </a:r>
+            <a:endParaRPr lang="ru-RU" dirty="0"/>
+          </a:p>
+        </p:txBody>
+      </p:sp>
+      <p:pic>
+        <p:nvPicPr>
+          <p:cNvPr id="8" name="Рисунок 7"/>
+          <p:cNvPicPr>
+            <a:picLocks noChangeAspect="1"/>
+          </p:cNvPicPr>
+          <p:nvPr/>
+        </p:nvPicPr>
+        <p:blipFill>
+          <a:blip r:embed="rId3"/>
+          <a:stretch>
+            <a:fillRect/>
+          </a:stretch>
+        </p:blipFill>
+        <p:spPr>
+          <a:xfrm>
+            <a:off x="10742612" y="3074075"/>
+            <a:ext cx="595948" cy="595948"/>
+          </a:xfrm>
+          <a:prstGeom prst="rect">
+            <a:avLst/>
+          </a:prstGeom>
+        </p:spPr>
+      </p:pic>
+      <p:sp>
+        <p:nvSpPr>
+          <p:cNvPr id="9" name="TextBox 8"/>
+          <p:cNvSpPr txBox="1"/>
+          <p:nvPr/>
+        </p:nvSpPr>
+        <p:spPr>
+          <a:xfrm>
+            <a:off x="684212" y="3074075"/>
+            <a:ext cx="10058400" cy="646331"/>
+          </a:xfrm>
+          <a:prstGeom prst="rect">
+            <a:avLst/>
+          </a:prstGeom>
+          <a:noFill/>
+        </p:spPr>
+        <p:txBody>
+          <a:bodyPr wrap="square" rtlCol="0">
+            <a:spAutoFit/>
+          </a:bodyPr>
+          <a:lstStyle/>
+          <a:p>
+            <a:r>
+              <a:rPr lang="ru-RU" dirty="0" smtClean="0"/>
+              <a:t>Чтобы разрушить башню противника нужно давать цель своим </a:t>
+            </a:r>
+            <a:r>
+              <a:rPr lang="ru-RU" dirty="0" smtClean="0"/>
+              <a:t>отрядам</a:t>
+            </a:r>
+            <a:r>
+              <a:rPr lang="ru-RU" dirty="0" smtClean="0"/>
+              <a:t>, </a:t>
+            </a:r>
+            <a:r>
+              <a:rPr lang="ru-RU" dirty="0" smtClean="0"/>
+              <a:t>для этого необходимо нажать на отряд игрока и нажать на появившуюся кнопку</a:t>
+            </a:r>
+            <a:endParaRPr lang="ru-RU" dirty="0"/>
+          </a:p>
+        </p:txBody>
+      </p:sp>
+      <p:sp>
+        <p:nvSpPr>
+          <p:cNvPr id="14" name="TextBox 13"/>
+          <p:cNvSpPr txBox="1"/>
+          <p:nvPr/>
+        </p:nvSpPr>
+        <p:spPr>
+          <a:xfrm>
+            <a:off x="1220371" y="4590976"/>
+            <a:ext cx="8728691" cy="369332"/>
+          </a:xfrm>
+          <a:prstGeom prst="rect">
+            <a:avLst/>
+          </a:prstGeom>
+          <a:noFill/>
+        </p:spPr>
+        <p:txBody>
+          <a:bodyPr wrap="square" rtlCol="0">
+            <a:spAutoFit/>
+          </a:bodyPr>
+          <a:lstStyle/>
+          <a:p>
+            <a:r>
+              <a:rPr lang="ru-RU" dirty="0" smtClean="0"/>
+              <a:t>У каждого отряда игрока и у башни при нажатии появляется количество здоровья</a:t>
+            </a:r>
+            <a:endParaRPr lang="ru-RU" dirty="0"/>
+          </a:p>
+        </p:txBody>
+      </p:sp>
+      <p:pic>
+        <p:nvPicPr>
+          <p:cNvPr id="15" name="Рисунок 14"/>
+          <p:cNvPicPr>
+            <a:picLocks noChangeAspect="1"/>
+          </p:cNvPicPr>
+          <p:nvPr/>
+        </p:nvPicPr>
+        <p:blipFill>
+          <a:blip r:embed="rId4"/>
+          <a:stretch>
+            <a:fillRect/>
+          </a:stretch>
+        </p:blipFill>
+        <p:spPr>
+          <a:xfrm>
+            <a:off x="8686824" y="5342057"/>
+            <a:ext cx="2524477" cy="619211"/>
+          </a:xfrm>
+          <a:prstGeom prst="rect">
+            <a:avLst/>
+          </a:prstGeom>
+        </p:spPr>
+      </p:pic>
+      <p:sp>
+        <p:nvSpPr>
+          <p:cNvPr id="16" name="TextBox 15"/>
+          <p:cNvSpPr txBox="1"/>
+          <p:nvPr/>
+        </p:nvSpPr>
+        <p:spPr>
+          <a:xfrm>
+            <a:off x="556953" y="5051499"/>
+            <a:ext cx="8129871" cy="369332"/>
+          </a:xfrm>
+          <a:prstGeom prst="rect">
+            <a:avLst/>
+          </a:prstGeom>
+          <a:noFill/>
+        </p:spPr>
+        <p:txBody>
+          <a:bodyPr wrap="square" rtlCol="0">
+            <a:spAutoFit/>
+          </a:bodyPr>
+          <a:lstStyle/>
+          <a:p>
+            <a:r>
+              <a:rPr lang="ru-RU" dirty="0" smtClean="0"/>
+              <a:t>Для разнообразия были добавлены заклинания.</a:t>
+            </a:r>
+            <a:endParaRPr lang="ru-RU" dirty="0"/>
+          </a:p>
+        </p:txBody>
+      </p:sp>
+      <p:sp>
+        <p:nvSpPr>
+          <p:cNvPr id="18" name="TextBox 17"/>
+          <p:cNvSpPr txBox="1"/>
+          <p:nvPr/>
+        </p:nvSpPr>
+        <p:spPr>
+          <a:xfrm>
+            <a:off x="556953" y="6413664"/>
+            <a:ext cx="7539644" cy="369332"/>
+          </a:xfrm>
+          <a:prstGeom prst="rect">
+            <a:avLst/>
+          </a:prstGeom>
+          <a:noFill/>
+        </p:spPr>
+        <p:txBody>
+          <a:bodyPr wrap="square" rtlCol="0">
+            <a:spAutoFit/>
+          </a:bodyPr>
+          <a:lstStyle/>
+          <a:p>
+            <a:r>
+              <a:rPr lang="ru-RU" dirty="0" smtClean="0"/>
+              <a:t>При разрушении одной из башен, будет </a:t>
+            </a:r>
+            <a:r>
+              <a:rPr lang="ru-RU" dirty="0" smtClean="0"/>
+              <a:t>появляется финальный экран</a:t>
+            </a:r>
+            <a:endParaRPr lang="ru-RU" dirty="0"/>
           </a:p>
         </p:txBody>
       </p:sp>
@@ -6252,31 +6506,103 @@
           <p:nvPr/>
         </p:nvPicPr>
         <p:blipFill>
-          <a:blip r:embed="rId2"/>
+          <a:blip r:embed="rId5"/>
           <a:stretch>
             <a:fillRect/>
           </a:stretch>
         </p:blipFill>
         <p:spPr>
           <a:xfrm>
-            <a:off x="685801" y="2065867"/>
-            <a:ext cx="4953691" cy="447737"/>
+            <a:off x="1528790" y="2712114"/>
+            <a:ext cx="838317" cy="257211"/>
           </a:xfrm>
           <a:prstGeom prst="rect">
             <a:avLst/>
           </a:prstGeom>
         </p:spPr>
       </p:pic>
-      <p:sp>
-        <p:nvSpPr>
-          <p:cNvPr id="4" name="TextBox 3"/>
+      <p:pic>
+        <p:nvPicPr>
+          <p:cNvPr id="4" name="Рисунок 3"/>
+          <p:cNvPicPr>
+            <a:picLocks noChangeAspect="1"/>
+          </p:cNvPicPr>
+          <p:nvPr/>
+        </p:nvPicPr>
+        <p:blipFill>
+          <a:blip r:embed="rId6"/>
+          <a:stretch>
+            <a:fillRect/>
+          </a:stretch>
+        </p:blipFill>
+        <p:spPr>
+          <a:xfrm>
+            <a:off x="8889072" y="3458418"/>
+            <a:ext cx="1781424" cy="304843"/>
+          </a:xfrm>
+          <a:prstGeom prst="rect">
+            <a:avLst/>
+          </a:prstGeom>
+        </p:spPr>
+      </p:pic>
+      <p:pic>
+        <p:nvPicPr>
+          <p:cNvPr id="11" name="Рисунок 10"/>
+          <p:cNvPicPr>
+            <a:picLocks noChangeAspect="1"/>
+          </p:cNvPicPr>
+          <p:nvPr/>
+        </p:nvPicPr>
+        <p:blipFill>
+          <a:blip r:embed="rId7"/>
+          <a:stretch>
+            <a:fillRect/>
+          </a:stretch>
+        </p:blipFill>
+        <p:spPr>
+          <a:xfrm>
+            <a:off x="684212" y="4741949"/>
+            <a:ext cx="476316" cy="228632"/>
+          </a:xfrm>
+          <a:prstGeom prst="rect">
+            <a:avLst/>
+          </a:prstGeom>
+        </p:spPr>
+      </p:pic>
+      <p:pic>
+        <p:nvPicPr>
+          <p:cNvPr id="13" name="Рисунок 12"/>
+          <p:cNvPicPr>
+            <a:picLocks noChangeAspect="1"/>
+          </p:cNvPicPr>
+          <p:nvPr/>
+        </p:nvPicPr>
+        <p:blipFill>
+          <a:blip r:embed="rId8"/>
+          <a:stretch>
+            <a:fillRect/>
+          </a:stretch>
+        </p:blipFill>
+        <p:spPr>
+          <a:xfrm>
+            <a:off x="684212" y="3798127"/>
+            <a:ext cx="1200318" cy="276264"/>
+          </a:xfrm>
+          <a:prstGeom prst="rect">
+            <a:avLst/>
+          </a:prstGeom>
+        </p:spPr>
+      </p:pic>
+      <p:sp>
+        <p:nvSpPr>
+          <p:cNvPr id="19" name="TextBox 18"/>
           <p:cNvSpPr txBox="1"/>
           <p:nvPr/>
         </p:nvSpPr>
         <p:spPr>
           <a:xfrm>
-            <a:off x="839585" y="3108960"/>
-            <a:ext cx="4995950" cy="369332"/>
+            <a:off x="1884530" y="3849212"/>
+            <a:ext cx="10058400" cy="369332"/>
           </a:xfrm>
           <a:prstGeom prst="rect">
             <a:avLst/>
@@ -6291,7 +6617,7 @@
           <a:p>
             <a:r>
               <a:rPr lang="ru-RU" dirty="0" smtClean="0"/>
-              <a:t>При нажатии на кнопку запускается уровень</a:t>
+              <a:t>Призывать новые отряды можно за золото, оно ограничено и зависит от выбранного уровня</a:t>
             </a:r>
             <a:endParaRPr lang="ru-RU" dirty="0"/>
           </a:p>
@@ -6300,7 +6626,7 @@
     </p:spTree>
     <p:extLst>
       <p:ext uri="{BB962C8B-B14F-4D97-AF65-F5344CB8AC3E}">
-        <p14:creationId xmlns:p14="http://schemas.microsoft.com/office/powerpoint/2010/main" val="2760268832"/>
+        <p14:creationId xmlns:p14="http://schemas.microsoft.com/office/powerpoint/2010/main" val="3129783581"/>
       </p:ext>
     </p:extLst>
   </p:cSld>
@@ -6329,13 +6655,7 @@
       </p:grpSpPr>
       <p:sp>
         <p:nvSpPr>
-          <p:cNvPr id="2" name="Заголовок 1">
-            <a:extLst>
-              <a:ext uri="{FF2B5EF4-FFF2-40B4-BE49-F238E27FC236}">
-                <a16:creationId xmlns:a16="http://schemas.microsoft.com/office/drawing/2014/main" id="{BA8E6D09-537C-44D2-B3C4-C52692C2C1E2}"/>
-              </a:ext>
-            </a:extLst>
-          </p:cNvPr>
+          <p:cNvPr id="2" name="Заголовок 1"/>
           <p:cNvSpPr>
             <a:spLocks noGrp="1"/>
           </p:cNvSpPr>
@@ -6343,12 +6663,7 @@
             <p:ph type="title"/>
           </p:nvPr>
         </p:nvSpPr>
-        <p:spPr>
-          <a:xfrm>
-            <a:off x="684212" y="73550"/>
-            <a:ext cx="10058400" cy="2152815"/>
-          </a:xfrm>
-        </p:spPr>
+        <p:spPr/>
         <p:txBody>
           <a:bodyPr/>
           <a:lstStyle/>
@@ -6362,7 +6677,186 @@
                   </a:schemeClr>
                 </a:solidFill>
               </a:rPr>
-              <a:t>Управление и игровой процесс</a:t>
+              <a:t>Отряды</a:t>
+            </a:r>
+            <a:endParaRPr lang="ru-RU" dirty="0"/>
+          </a:p>
+        </p:txBody>
+      </p:sp>
+      <p:pic>
+        <p:nvPicPr>
+          <p:cNvPr id="4" name="Рисунок 3"/>
+          <p:cNvPicPr>
+            <a:picLocks noChangeAspect="1"/>
+          </p:cNvPicPr>
+          <p:nvPr/>
+        </p:nvPicPr>
+        <p:blipFill>
+          <a:blip r:embed="rId2"/>
+          <a:stretch>
+            <a:fillRect/>
+          </a:stretch>
+        </p:blipFill>
+        <p:spPr>
+          <a:xfrm>
+            <a:off x="685801" y="2065867"/>
+            <a:ext cx="1051128" cy="1051128"/>
+          </a:xfrm>
+          <a:prstGeom prst="rect">
+            <a:avLst/>
+          </a:prstGeom>
+        </p:spPr>
+      </p:pic>
+      <p:sp>
+        <p:nvSpPr>
+          <p:cNvPr id="5" name="TextBox 4"/>
+          <p:cNvSpPr txBox="1"/>
+          <p:nvPr/>
+        </p:nvSpPr>
+        <p:spPr>
+          <a:xfrm>
+            <a:off x="1138844" y="3657600"/>
+            <a:ext cx="5178829" cy="1477328"/>
+          </a:xfrm>
+          <a:prstGeom prst="rect">
+            <a:avLst/>
+          </a:prstGeom>
+          <a:noFill/>
+        </p:spPr>
+        <p:txBody>
+          <a:bodyPr wrap="square" rtlCol="0">
+            <a:spAutoFit/>
+          </a:bodyPr>
+          <a:lstStyle/>
+          <a:p>
+            <a:r>
+              <a:rPr lang="ru-RU" dirty="0" smtClean="0"/>
+              <a:t>Воины.</a:t>
+            </a:r>
+          </a:p>
+          <a:p>
+            <a:r>
+              <a:rPr lang="ru-RU" dirty="0" smtClean="0"/>
+              <a:t>Могут атаковать только в ближнем бою, при нападении на них, дают отпор только при малом количестве здоровья, также вступают в сражение с вражеским отрядом, который мешает им пройти.</a:t>
+            </a:r>
+            <a:endParaRPr lang="ru-RU" dirty="0"/>
+          </a:p>
+        </p:txBody>
+      </p:sp>
+      <p:pic>
+        <p:nvPicPr>
+          <p:cNvPr id="6" name="Рисунок 5"/>
+          <p:cNvPicPr>
+            <a:picLocks noChangeAspect="1"/>
+          </p:cNvPicPr>
+          <p:nvPr/>
+        </p:nvPicPr>
+        <p:blipFill>
+          <a:blip r:embed="rId2"/>
+          <a:stretch>
+            <a:fillRect/>
+          </a:stretch>
+        </p:blipFill>
+        <p:spPr>
+          <a:xfrm>
+            <a:off x="6317673" y="2336170"/>
+            <a:ext cx="1051128" cy="1051128"/>
+          </a:xfrm>
+          <a:prstGeom prst="rect">
+            <a:avLst/>
+          </a:prstGeom>
+        </p:spPr>
+      </p:pic>
+      <p:sp>
+        <p:nvSpPr>
+          <p:cNvPr id="7" name="TextBox 6"/>
+          <p:cNvSpPr txBox="1"/>
+          <p:nvPr/>
+        </p:nvSpPr>
+        <p:spPr>
+          <a:xfrm>
+            <a:off x="6317673" y="3657600"/>
+            <a:ext cx="5178829" cy="1200329"/>
+          </a:xfrm>
+          <a:prstGeom prst="rect">
+            <a:avLst/>
+          </a:prstGeom>
+          <a:noFill/>
+        </p:spPr>
+        <p:txBody>
+          <a:bodyPr wrap="square" rtlCol="0">
+            <a:spAutoFit/>
+          </a:bodyPr>
+          <a:lstStyle/>
+          <a:p>
+            <a:r>
+              <a:rPr lang="ru-RU" dirty="0" smtClean="0"/>
+              <a:t>Лучники.</a:t>
+            </a:r>
+          </a:p>
+          <a:p>
+            <a:r>
+              <a:rPr lang="ru-RU" dirty="0" smtClean="0"/>
+              <a:t>Имеют луки, поэтому могут атаковать на большой дистанции, при этом они атакуют любого врага, который попадет в зону поражения.</a:t>
+            </a:r>
+          </a:p>
+        </p:txBody>
+      </p:sp>
+    </p:spTree>
+    <p:extLst>
+      <p:ext uri="{BB962C8B-B14F-4D97-AF65-F5344CB8AC3E}">
+        <p14:creationId xmlns:p14="http://schemas.microsoft.com/office/powerpoint/2010/main" val="286333370"/>
+      </p:ext>
+    </p:extLst>
+  </p:cSld>
+  <p:clrMapOvr>
+    <a:masterClrMapping/>
+  </p:clrMapOvr>
+</p:sld>
+</file>
+
+<file path=ppt/slides/slide5.xml><?xml version="1.0" encoding="utf-8"?>
+<p:sld xmlns:a="http://schemas.openxmlformats.org/drawingml/2006/main" xmlns:r="http://schemas.openxmlformats.org/officeDocument/2006/relationships" xmlns:p="http://schemas.openxmlformats.org/presentationml/2006/main">
+  <p:cSld>
+    <p:spTree>
+      <p:nvGrpSpPr>
+        <p:cNvPr id="1" name=""/>
+        <p:cNvGrpSpPr/>
+        <p:nvPr/>
+      </p:nvGrpSpPr>
+      <p:grpSpPr>
+        <a:xfrm>
+          <a:off x="0" y="0"/>
+          <a:ext cx="0" cy="0"/>
+          <a:chOff x="0" y="0"/>
+          <a:chExt cx="0" cy="0"/>
+        </a:xfrm>
+      </p:grpSpPr>
+      <p:sp>
+        <p:nvSpPr>
+          <p:cNvPr id="2" name="Заголовок 1"/>
+          <p:cNvSpPr>
+            <a:spLocks noGrp="1"/>
+          </p:cNvSpPr>
+          <p:nvPr>
+            <p:ph type="title"/>
+          </p:nvPr>
+        </p:nvSpPr>
+        <p:spPr/>
+        <p:txBody>
+          <a:bodyPr/>
+          <a:lstStyle/>
+          <a:p>
+            <a:r>
+              <a:rPr lang="ru-RU" dirty="0">
+                <a:solidFill>
+                  <a:schemeClr val="accent2">
+                    <a:lumMod val="60000"/>
+                    <a:lumOff val="40000"/>
+                  </a:schemeClr>
+                </a:solidFill>
+              </a:rPr>
+              <a:t>Заклинания</a:t>
             </a:r>
             <a:endParaRPr lang="ru-RU" dirty="0">
               <a:solidFill>
@@ -6377,28 +6871,22 @@
       </p:sp>
       <p:pic>
         <p:nvPicPr>
-          <p:cNvPr id="5" name="Рисунок 4"/>
+          <p:cNvPr id="3" name="Рисунок 2"/>
           <p:cNvPicPr>
             <a:picLocks noChangeAspect="1"/>
           </p:cNvPicPr>
           <p:nvPr/>
         </p:nvPicPr>
         <p:blipFill>
-          <a:blip r:embed="rId2">
-            <a:extLst>
-              <a:ext uri="{28A0092B-C50C-407E-A947-70E740481C1C}">
-                <a14:useLocalDpi xmlns:a14="http://schemas.microsoft.com/office/drawing/2010/main" val="0"/>
-              </a:ext>
-            </a:extLst>
-          </a:blip>
+          <a:blip r:embed="rId2"/>
           <a:stretch>
             <a:fillRect/>
           </a:stretch>
         </p:blipFill>
         <p:spPr>
           <a:xfrm>
-            <a:off x="684212" y="2226365"/>
-            <a:ext cx="762000" cy="762000"/>
+            <a:off x="685801" y="2065867"/>
+            <a:ext cx="609600" cy="609600"/>
           </a:xfrm>
           <a:prstGeom prst="rect">
             <a:avLst/>
@@ -6407,14 +6895,14 @@
       </p:pic>
       <p:sp>
         <p:nvSpPr>
-          <p:cNvPr id="6" name="TextBox 5"/>
+          <p:cNvPr id="4" name="TextBox 3"/>
           <p:cNvSpPr txBox="1"/>
           <p:nvPr/>
         </p:nvSpPr>
         <p:spPr>
           <a:xfrm>
-            <a:off x="1446212" y="2238033"/>
-            <a:ext cx="9892348" cy="369332"/>
+            <a:off x="2279074" y="5000569"/>
+            <a:ext cx="9391995" cy="923330"/>
           </a:xfrm>
           <a:prstGeom prst="rect">
             <a:avLst/>
@@ -6429,15 +6917,20 @@
           <a:p>
             <a:r>
               <a:rPr lang="ru-RU" dirty="0" smtClean="0"/>
-              <a:t>Чтобы создать новых персонажей, необходимо нажать на башню игрока и на появившуюся кнопку </a:t>
-            </a:r>
-            <a:endParaRPr lang="ru-RU" dirty="0"/>
+              <a:t>Заклинание яда.</a:t>
+            </a:r>
+          </a:p>
+          <a:p>
+            <a:r>
+              <a:rPr lang="ru-RU" dirty="0" smtClean="0"/>
+              <a:t>«Разливается на уровень» и вражеские отряды, которые находятся в радиусе поражения будут получать урон.</a:t>
+            </a:r>
           </a:p>
         </p:txBody>
       </p:sp>
       <p:pic>
         <p:nvPicPr>
-          <p:cNvPr id="7" name="Рисунок 6"/>
+          <p:cNvPr id="5" name="Рисунок 4"/>
           <p:cNvPicPr>
             <a:picLocks noChangeAspect="1"/>
           </p:cNvPicPr>
@@ -6451,17 +6944,52 @@
         </p:blipFill>
         <p:spPr>
           <a:xfrm>
-            <a:off x="1545964" y="2693075"/>
-            <a:ext cx="552527" cy="209579"/>
+            <a:off x="5751513" y="2065867"/>
+            <a:ext cx="609600" cy="609600"/>
           </a:xfrm>
           <a:prstGeom prst="rect">
             <a:avLst/>
           </a:prstGeom>
         </p:spPr>
       </p:pic>
+      <p:sp>
+        <p:nvSpPr>
+          <p:cNvPr id="6" name="TextBox 5"/>
+          <p:cNvSpPr txBox="1"/>
+          <p:nvPr/>
+        </p:nvSpPr>
+        <p:spPr>
+          <a:xfrm>
+            <a:off x="5751513" y="3300153"/>
+            <a:ext cx="4429297" cy="923330"/>
+          </a:xfrm>
+          <a:prstGeom prst="rect">
+            <a:avLst/>
+          </a:prstGeom>
+          <a:noFill/>
+        </p:spPr>
+        <p:txBody>
+          <a:bodyPr wrap="square" rtlCol="0">
+            <a:spAutoFit/>
+          </a:bodyPr>
+          <a:lstStyle/>
+          <a:p>
+            <a:r>
+              <a:rPr lang="ru-RU" dirty="0" smtClean="0"/>
+              <a:t>Заклинание молнии.</a:t>
+            </a:r>
+          </a:p>
+          <a:p>
+            <a:r>
+              <a:rPr lang="ru-RU" dirty="0" smtClean="0"/>
+              <a:t>Используется на вражеский отряд для мощного точечного удара.</a:t>
+            </a:r>
+          </a:p>
+        </p:txBody>
+      </p:sp>
       <p:pic>
         <p:nvPicPr>
-          <p:cNvPr id="8" name="Рисунок 7"/>
+          <p:cNvPr id="7" name="Рисунок 6"/>
           <p:cNvPicPr>
             <a:picLocks noChangeAspect="1"/>
           </p:cNvPicPr>
@@ -6475,8 +7003,8 @@
         </p:blipFill>
         <p:spPr>
           <a:xfrm>
-            <a:off x="10742612" y="3074075"/>
-            <a:ext cx="595948" cy="595948"/>
+            <a:off x="685801" y="5402167"/>
+            <a:ext cx="600075" cy="600075"/>
           </a:xfrm>
           <a:prstGeom prst="rect">
             <a:avLst/>
@@ -6485,14 +7013,14 @@
       </p:pic>
       <p:sp>
         <p:nvSpPr>
-          <p:cNvPr id="9" name="TextBox 8"/>
+          <p:cNvPr id="8" name="TextBox 7"/>
           <p:cNvSpPr txBox="1"/>
           <p:nvPr/>
         </p:nvSpPr>
         <p:spPr>
           <a:xfrm>
-            <a:off x="684212" y="3074075"/>
-            <a:ext cx="10058400" cy="646331"/>
+            <a:off x="1143001" y="3452553"/>
+            <a:ext cx="4429297" cy="1477328"/>
           </a:xfrm>
           <a:prstGeom prst="rect">
             <a:avLst/>
@@ -6507,207 +7035,21 @@
           <a:p>
             <a:r>
               <a:rPr lang="ru-RU" dirty="0" smtClean="0"/>
-              <a:t>Чтобы разрушить башню противника нужно давать цель своим войнам, для этого необходимо нажать на отряд игрока и нажать на появившуюся кнопку</a:t>
-            </a:r>
-            <a:endParaRPr lang="ru-RU" dirty="0"/>
-          </a:p>
-        </p:txBody>
-      </p:sp>
-      <p:pic>
-        <p:nvPicPr>
-          <p:cNvPr id="10" name="Рисунок 9"/>
-          <p:cNvPicPr>
-            <a:picLocks noChangeAspect="1"/>
-          </p:cNvPicPr>
-          <p:nvPr/>
-        </p:nvPicPr>
-        <p:blipFill>
-          <a:blip r:embed="rId5"/>
-          <a:stretch>
-            <a:fillRect/>
-          </a:stretch>
-        </p:blipFill>
-        <p:spPr>
-          <a:xfrm>
-            <a:off x="9401701" y="3469970"/>
-            <a:ext cx="1152686" cy="200053"/>
-          </a:xfrm>
-          <a:prstGeom prst="rect">
-            <a:avLst/>
-          </a:prstGeom>
-        </p:spPr>
-      </p:pic>
-      <p:pic>
-        <p:nvPicPr>
-          <p:cNvPr id="12" name="Рисунок 11"/>
-          <p:cNvPicPr>
-            <a:picLocks noChangeAspect="1"/>
-          </p:cNvPicPr>
-          <p:nvPr/>
-        </p:nvPicPr>
-        <p:blipFill rotWithShape="1">
-          <a:blip r:embed="rId6"/>
-          <a:srcRect l="424" t="4388" r="-1" b="-1"/>
-          <a:stretch/>
-        </p:blipFill>
-        <p:spPr>
-          <a:xfrm>
-            <a:off x="684212" y="3806556"/>
-            <a:ext cx="1925657" cy="200385"/>
-          </a:xfrm>
-          <a:prstGeom prst="rect">
-            <a:avLst/>
-          </a:prstGeom>
-        </p:spPr>
-      </p:pic>
-      <p:sp>
-        <p:nvSpPr>
-          <p:cNvPr id="14" name="TextBox 13"/>
-          <p:cNvSpPr txBox="1"/>
-          <p:nvPr/>
-        </p:nvSpPr>
-        <p:spPr>
-          <a:xfrm>
-            <a:off x="2609869" y="3806116"/>
-            <a:ext cx="8728691" cy="369332"/>
-          </a:xfrm>
-          <a:prstGeom prst="rect">
-            <a:avLst/>
-          </a:prstGeom>
-          <a:noFill/>
-        </p:spPr>
-        <p:txBody>
-          <a:bodyPr wrap="square" rtlCol="0">
-            <a:spAutoFit/>
-          </a:bodyPr>
-          <a:lstStyle/>
+              <a:t>Заклинание для восстановления здоровья.</a:t>
+            </a:r>
+          </a:p>
           <a:p>
             <a:r>
               <a:rPr lang="ru-RU" dirty="0" smtClean="0"/>
-              <a:t>У каждого отряда игрока и у башни при нажатии появляется количество здоровья</a:t>
-            </a:r>
-            <a:endParaRPr lang="ru-RU" dirty="0"/>
-          </a:p>
-        </p:txBody>
-      </p:sp>
-      <p:pic>
-        <p:nvPicPr>
-          <p:cNvPr id="15" name="Рисунок 14"/>
-          <p:cNvPicPr>
-            <a:picLocks noChangeAspect="1"/>
-          </p:cNvPicPr>
-          <p:nvPr/>
-        </p:nvPicPr>
-        <p:blipFill>
-          <a:blip r:embed="rId7"/>
-          <a:stretch>
-            <a:fillRect/>
-          </a:stretch>
-        </p:blipFill>
-        <p:spPr>
-          <a:xfrm>
-            <a:off x="8814083" y="4261158"/>
-            <a:ext cx="2524477" cy="619211"/>
-          </a:xfrm>
-          <a:prstGeom prst="rect">
-            <a:avLst/>
-          </a:prstGeom>
-        </p:spPr>
-      </p:pic>
-      <p:sp>
-        <p:nvSpPr>
-          <p:cNvPr id="16" name="TextBox 15"/>
-          <p:cNvSpPr txBox="1"/>
-          <p:nvPr/>
-        </p:nvSpPr>
-        <p:spPr>
-          <a:xfrm>
-            <a:off x="684212" y="4261158"/>
-            <a:ext cx="8129871" cy="646331"/>
-          </a:xfrm>
-          <a:prstGeom prst="rect">
-            <a:avLst/>
-          </a:prstGeom>
-          <a:noFill/>
-        </p:spPr>
-        <p:txBody>
-          <a:bodyPr wrap="square" rtlCol="0">
-            <a:spAutoFit/>
-          </a:bodyPr>
-          <a:lstStyle/>
-          <a:p>
-            <a:r>
-              <a:rPr lang="ru-RU" dirty="0" smtClean="0"/>
-              <a:t>Для доминации над машиной существуют сильные заклинания, их возможности мы раскрывать не будем </a:t>
-            </a:r>
-            <a:r>
-              <a:rPr lang="ru-RU" dirty="0" smtClean="0">
-                <a:sym typeface="Wingdings" panose="05000000000000000000" pitchFamily="2" charset="2"/>
-              </a:rPr>
-              <a:t></a:t>
-            </a:r>
-            <a:endParaRPr lang="ru-RU" dirty="0"/>
-          </a:p>
-        </p:txBody>
-      </p:sp>
-      <p:pic>
-        <p:nvPicPr>
-          <p:cNvPr id="17" name="Рисунок 16"/>
-          <p:cNvPicPr>
-            <a:picLocks noChangeAspect="1"/>
-          </p:cNvPicPr>
-          <p:nvPr/>
-        </p:nvPicPr>
-        <p:blipFill>
-          <a:blip r:embed="rId8"/>
-          <a:stretch>
-            <a:fillRect/>
-          </a:stretch>
-        </p:blipFill>
-        <p:spPr>
-          <a:xfrm>
-            <a:off x="684212" y="4993199"/>
-            <a:ext cx="2876951" cy="971686"/>
-          </a:xfrm>
-          <a:prstGeom prst="rect">
-            <a:avLst/>
-          </a:prstGeom>
-        </p:spPr>
-      </p:pic>
-      <p:sp>
-        <p:nvSpPr>
-          <p:cNvPr id="18" name="TextBox 17"/>
-          <p:cNvSpPr txBox="1"/>
-          <p:nvPr/>
-        </p:nvSpPr>
-        <p:spPr>
-          <a:xfrm>
-            <a:off x="3798916" y="5104015"/>
-            <a:ext cx="7539644" cy="646331"/>
-          </a:xfrm>
-          <a:prstGeom prst="rect">
-            <a:avLst/>
-          </a:prstGeom>
-          <a:noFill/>
-        </p:spPr>
-        <p:txBody>
-          <a:bodyPr wrap="square" rtlCol="0">
-            <a:spAutoFit/>
-          </a:bodyPr>
-          <a:lstStyle/>
-          <a:p>
-            <a:r>
-              <a:rPr lang="ru-RU" dirty="0" smtClean="0"/>
-              <a:t>При разрушении одной из башен, будет появляется кнопка с результатом игры, если на нее нажать, то мы вернемся в меню выбора уровней</a:t>
-            </a:r>
-            <a:endParaRPr lang="ru-RU" dirty="0"/>
+              <a:t>Можно «разлить на уровень» и отряды игрока, которые находятся в радиусе действия будут получать дополнительные очки здоровья.</a:t>
+            </a:r>
           </a:p>
         </p:txBody>
       </p:sp>
     </p:spTree>
     <p:extLst>
       <p:ext uri="{BB962C8B-B14F-4D97-AF65-F5344CB8AC3E}">
-        <p14:creationId xmlns:p14="http://schemas.microsoft.com/office/powerpoint/2010/main" val="3129783581"/>
+        <p14:creationId xmlns:p14="http://schemas.microsoft.com/office/powerpoint/2010/main" val="1498902994"/>
       </p:ext>
     </p:extLst>
   </p:cSld>

</xml_diff>